<commit_message>
Fix case sensitive issue with image in demos.
</commit_message>
<xml_diff>
--- a/Presentation/CreatingTheUI/CreatingTheUI.pptx
+++ b/Presentation/CreatingTheUI/CreatingTheUI.pptx
@@ -226,7 +226,7 @@
           <a:p>
             <a:fld id="{312E7B4A-039C-48A2-9B2C-AF16AA3873D8}" type="datetimeFigureOut">
               <a:rPr lang="en-US" smtClean="0"/>
-              <a:t>20/07/2015</a:t>
+              <a:t>7/23/2015</a:t>
             </a:fld>
             <a:endParaRPr lang="en-US"/>
           </a:p>
@@ -391,7 +391,7 @@
           <a:p>
             <a:fld id="{DA005A0C-54D9-45AA-87D4-C551D08DFCE1}" type="datetimeFigureOut">
               <a:rPr lang="en-US" smtClean="0"/>
-              <a:t>20/07/2015</a:t>
+              <a:t>7/23/2015</a:t>
             </a:fld>
             <a:endParaRPr lang="en-US"/>
           </a:p>
@@ -17485,13 +17485,13 @@
   <p:clrMapOvr>
     <a:masterClrMapping/>
   </p:clrMapOvr>
-  <mc:AlternateContent xmlns:mc="http://schemas.openxmlformats.org/markup-compatibility/2006">
-    <mc:Choice xmlns:p14="http://schemas.microsoft.com/office/powerpoint/2010/main" Requires="p14">
+  <mc:AlternateContent xmlns:mc="http://schemas.openxmlformats.org/markup-compatibility/2006" xmlns:p14="http://schemas.microsoft.com/office/powerpoint/2010/main">
+    <mc:Choice Requires="p14">
       <p:transition spd="med" p14:dur="700">
         <p:fade/>
       </p:transition>
     </mc:Choice>
-    <mc:Fallback>
+    <mc:Fallback xmlns="">
       <p:transition spd="med">
         <p:fade/>
       </p:transition>
@@ -17638,13 +17638,13 @@
   <p:clrMapOvr>
     <a:masterClrMapping/>
   </p:clrMapOvr>
-  <mc:AlternateContent xmlns:mc="http://schemas.openxmlformats.org/markup-compatibility/2006">
-    <mc:Choice xmlns:p14="http://schemas.microsoft.com/office/powerpoint/2010/main" Requires="p14">
+  <mc:AlternateContent xmlns:mc="http://schemas.openxmlformats.org/markup-compatibility/2006" xmlns:p14="http://schemas.microsoft.com/office/powerpoint/2010/main">
+    <mc:Choice Requires="p14">
       <p:transition spd="med" p14:dur="700">
         <p:fade/>
       </p:transition>
     </mc:Choice>
-    <mc:Fallback>
+    <mc:Fallback xmlns="">
       <p:transition spd="med">
         <p:fade/>
       </p:transition>
@@ -18624,13 +18624,13 @@
   <p:clrMapOvr>
     <a:masterClrMapping/>
   </p:clrMapOvr>
-  <mc:AlternateContent xmlns:mc="http://schemas.openxmlformats.org/markup-compatibility/2006">
-    <mc:Choice xmlns:p14="http://schemas.microsoft.com/office/powerpoint/2010/main" Requires="p14">
+  <mc:AlternateContent xmlns:mc="http://schemas.openxmlformats.org/markup-compatibility/2006" xmlns:p14="http://schemas.microsoft.com/office/powerpoint/2010/main">
+    <mc:Choice Requires="p14">
       <p:transition spd="med" p14:dur="700">
         <p:fade/>
       </p:transition>
     </mc:Choice>
-    <mc:Fallback>
+    <mc:Fallback xmlns="">
       <p:transition spd="med">
         <p:fade/>
       </p:transition>
@@ -19030,13 +19030,13 @@
   <p:clrMapOvr>
     <a:masterClrMapping/>
   </p:clrMapOvr>
-  <mc:AlternateContent xmlns:mc="http://schemas.openxmlformats.org/markup-compatibility/2006">
-    <mc:Choice xmlns:p14="http://schemas.microsoft.com/office/powerpoint/2010/main" Requires="p14">
+  <mc:AlternateContent xmlns:mc="http://schemas.openxmlformats.org/markup-compatibility/2006" xmlns:p14="http://schemas.microsoft.com/office/powerpoint/2010/main">
+    <mc:Choice Requires="p14">
       <p:transition spd="med" p14:dur="700">
         <p:fade/>
       </p:transition>
     </mc:Choice>
-    <mc:Fallback>
+    <mc:Fallback xmlns="">
       <p:transition spd="med">
         <p:fade/>
       </p:transition>
@@ -19235,13 +19235,13 @@
   <p:clrMapOvr>
     <a:masterClrMapping/>
   </p:clrMapOvr>
-  <mc:AlternateContent xmlns:mc="http://schemas.openxmlformats.org/markup-compatibility/2006">
-    <mc:Choice xmlns:p14="http://schemas.microsoft.com/office/powerpoint/2010/main" Requires="p14">
+  <mc:AlternateContent xmlns:mc="http://schemas.openxmlformats.org/markup-compatibility/2006" xmlns:p14="http://schemas.microsoft.com/office/powerpoint/2010/main">
+    <mc:Choice Requires="p14">
       <p:transition spd="med" p14:dur="700">
         <p:fade/>
       </p:transition>
     </mc:Choice>
-    <mc:Fallback>
+    <mc:Fallback xmlns="">
       <p:transition spd="med">
         <p:fade/>
       </p:transition>
@@ -19359,13 +19359,13 @@
   <p:clrMapOvr>
     <a:masterClrMapping/>
   </p:clrMapOvr>
-  <mc:AlternateContent xmlns:mc="http://schemas.openxmlformats.org/markup-compatibility/2006">
-    <mc:Choice xmlns:p14="http://schemas.microsoft.com/office/powerpoint/2010/main" Requires="p14">
+  <mc:AlternateContent xmlns:mc="http://schemas.openxmlformats.org/markup-compatibility/2006" xmlns:p14="http://schemas.microsoft.com/office/powerpoint/2010/main">
+    <mc:Choice Requires="p14">
       <p:transition spd="med" p14:dur="700">
         <p:fade/>
       </p:transition>
     </mc:Choice>
-    <mc:Fallback>
+    <mc:Fallback xmlns="">
       <p:transition spd="med">
         <p:fade/>
       </p:transition>
@@ -19415,8 +19415,13 @@
           <a:p>
             <a:r>
               <a:rPr lang="en-US" dirty="0"/>
-              <a:t>Using Jade Templates</a:t>
-            </a:r>
+              <a:t>Using Jade </a:t>
+            </a:r>
+            <a:r>
+              <a:rPr lang="en-US" dirty="0" smtClean="0"/>
+              <a:t>Templates with Bootstrap</a:t>
+            </a:r>
+            <a:endParaRPr lang="en-US" dirty="0"/>
           </a:p>
         </p:txBody>
       </p:sp>
@@ -19430,13 +19435,13 @@
   <p:clrMapOvr>
     <a:masterClrMapping/>
   </p:clrMapOvr>
-  <mc:AlternateContent xmlns:mc="http://schemas.openxmlformats.org/markup-compatibility/2006">
-    <mc:Choice xmlns:p14="http://schemas.microsoft.com/office/powerpoint/2010/main" Requires="p14">
+  <mc:AlternateContent xmlns:mc="http://schemas.openxmlformats.org/markup-compatibility/2006" xmlns:p14="http://schemas.microsoft.com/office/powerpoint/2010/main">
+    <mc:Choice Requires="p14">
       <p:transition spd="med" p14:dur="700">
         <p:fade/>
       </p:transition>
     </mc:Choice>
-    <mc:Fallback>
+    <mc:Fallback xmlns="">
       <p:transition spd="med">
         <p:fade/>
       </p:transition>
@@ -21719,13 +21724,13 @@
   <p:clrMapOvr>
     <a:masterClrMapping/>
   </p:clrMapOvr>
-  <mc:AlternateContent xmlns:mc="http://schemas.openxmlformats.org/markup-compatibility/2006">
-    <mc:Choice xmlns:p14="http://schemas.microsoft.com/office/powerpoint/2010/main" Requires="p14">
+  <mc:AlternateContent xmlns:mc="http://schemas.openxmlformats.org/markup-compatibility/2006" xmlns:p14="http://schemas.microsoft.com/office/powerpoint/2010/main">
+    <mc:Choice Requires="p14">
       <p:transition spd="med" p14:dur="700">
         <p:fade/>
       </p:transition>
     </mc:Choice>
-    <mc:Fallback>
+    <mc:Fallback xmlns="">
       <p:transition spd="med">
         <p:fade/>
       </p:transition>
@@ -21845,13 +21850,13 @@
   <p:clrMapOvr>
     <a:masterClrMapping/>
   </p:clrMapOvr>
-  <mc:AlternateContent xmlns:mc="http://schemas.openxmlformats.org/markup-compatibility/2006">
-    <mc:Choice xmlns:p14="http://schemas.microsoft.com/office/powerpoint/2010/main" Requires="p14">
+  <mc:AlternateContent xmlns:mc="http://schemas.openxmlformats.org/markup-compatibility/2006" xmlns:p14="http://schemas.microsoft.com/office/powerpoint/2010/main">
+    <mc:Choice Requires="p14">
       <p:transition spd="med" p14:dur="700">
         <p:fade/>
       </p:transition>
     </mc:Choice>
-    <mc:Fallback>
+    <mc:Fallback xmlns="">
       <p:transition spd="med">
         <p:fade/>
       </p:transition>
@@ -23890,15 +23895,6 @@
 </file>
 
 <file path=customXml/item1.xml><?xml version="1.0" encoding="utf-8"?>
-<?mso-contentType ?>
-<FormTemplates xmlns="http://schemas.microsoft.com/sharepoint/v3/contenttype/forms">
-  <Display>DocumentLibraryForm</Display>
-  <Edit>DocumentLibraryForm</Edit>
-  <New>DocumentLibraryForm</New>
-</FormTemplates>
-</file>
-
-<file path=customXml/item2.xml><?xml version="1.0" encoding="utf-8"?>
 <ct:contentTypeSchema xmlns:ct="http://schemas.microsoft.com/office/2006/metadata/contentType" xmlns:ma="http://schemas.microsoft.com/office/2006/metadata/properties/metaAttributes" ct:_="" ma:_="" ma:contentTypeName="Document" ma:contentTypeID="0x010100391E57C78B9F604FB8BAD296D1460E2A" ma:contentTypeVersion="1" ma:contentTypeDescription="Create a new document." ma:contentTypeScope="" ma:versionID="fb382fe2362acd2155f454904f478e4d">
   <xsd:schema xmlns:xsd="http://www.w3.org/2001/XMLSchema" xmlns:xs="http://www.w3.org/2001/XMLSchema" xmlns:p="http://schemas.microsoft.com/office/2006/metadata/properties" xmlns:ns3="636b0322-90fb-440c-9cbc-22749e7231e9" targetNamespace="http://schemas.microsoft.com/office/2006/metadata/properties" ma:root="true" ma:fieldsID="b9887c63ce4710c1aeb75a5f03aecb69" ns3:_="">
     <xsd:import namespace="636b0322-90fb-440c-9cbc-22749e7231e9"/>
@@ -24038,6 +24034,15 @@
 </ct:contentTypeSchema>
 </file>
 
+<file path=customXml/item2.xml><?xml version="1.0" encoding="utf-8"?>
+<?mso-contentType ?>
+<FormTemplates xmlns="http://schemas.microsoft.com/sharepoint/v3/contenttype/forms">
+  <Display>DocumentLibraryForm</Display>
+  <Edit>DocumentLibraryForm</Edit>
+  <New>DocumentLibraryForm</New>
+</FormTemplates>
+</file>
+
 <file path=customXml/item3.xml><?xml version="1.0" encoding="utf-8"?>
 <p:properties xmlns:p="http://schemas.microsoft.com/office/2006/metadata/properties" xmlns:xsi="http://www.w3.org/2001/XMLSchema-instance" xmlns:pc="http://schemas.microsoft.com/office/infopath/2007/PartnerControls">
   <documentManagement/>
@@ -24045,14 +24050,6 @@
 </file>
 
 <file path=customXml/itemProps1.xml><?xml version="1.0" encoding="utf-8"?>
-<ds:datastoreItem xmlns:ds="http://schemas.openxmlformats.org/officeDocument/2006/customXml" ds:itemID="{B0CA13EC-1D3C-4D6F-8D1C-E8A452CFC79A}">
-  <ds:schemaRefs>
-    <ds:schemaRef ds:uri="http://schemas.microsoft.com/sharepoint/v3/contenttype/forms"/>
-  </ds:schemaRefs>
-</ds:datastoreItem>
-</file>
-
-<file path=customXml/itemProps2.xml><?xml version="1.0" encoding="utf-8"?>
 <ds:datastoreItem xmlns:ds="http://schemas.openxmlformats.org/officeDocument/2006/customXml" ds:itemID="{7B70CE0C-0988-423A-BF66-B40F6A1061FF}">
   <ds:schemaRefs>
     <ds:schemaRef ds:uri="http://schemas.microsoft.com/office/2006/metadata/contentType"/>
@@ -24066,6 +24063,14 @@
     <ds:schemaRef ds:uri="http://purl.org/dc/elements/1.1/"/>
     <ds:schemaRef ds:uri="http://purl.org/dc/terms/"/>
     <ds:schemaRef ds:uri="http://schemas.microsoft.com/internal/obd"/>
+  </ds:schemaRefs>
+</ds:datastoreItem>
+</file>
+
+<file path=customXml/itemProps2.xml><?xml version="1.0" encoding="utf-8"?>
+<ds:datastoreItem xmlns:ds="http://schemas.openxmlformats.org/officeDocument/2006/customXml" ds:itemID="{B0CA13EC-1D3C-4D6F-8D1C-E8A452CFC79A}">
+  <ds:schemaRefs>
+    <ds:schemaRef ds:uri="http://schemas.microsoft.com/sharepoint/v3/contenttype/forms"/>
   </ds:schemaRefs>
 </ds:datastoreItem>
 </file>

</xml_diff>

<commit_message>
Created CreatingTheUI reveal.js presentation
</commit_message>
<xml_diff>
--- a/Presentation/CreatingTheUI/CreatingTheUI.pptx
+++ b/Presentation/CreatingTheUI/CreatingTheUI.pptx
@@ -226,7 +226,7 @@
           <a:p>
             <a:fld id="{312E7B4A-039C-48A2-9B2C-AF16AA3873D8}" type="datetimeFigureOut">
               <a:rPr lang="en-US" smtClean="0"/>
-              <a:t>7/23/2015</a:t>
+              <a:t>1/25/2016</a:t>
             </a:fld>
             <a:endParaRPr lang="en-US"/>
           </a:p>
@@ -391,7 +391,7 @@
           <a:p>
             <a:fld id="{DA005A0C-54D9-45AA-87D4-C551D08DFCE1}" type="datetimeFigureOut">
               <a:rPr lang="en-US" smtClean="0"/>
-              <a:t>7/23/2015</a:t>
+              <a:t>1/25/2016</a:t>
             </a:fld>
             <a:endParaRPr lang="en-US"/>
           </a:p>
@@ -1012,10 +1012,34 @@
                 <a:tableStyleId>{5C22544A-7EE6-4342-B048-85BDC9FD1C3A}</a:tableStyleId>
               </a:tblPr>
               <a:tblGrid>
-                <a:gridCol w="2764105"/>
-                <a:gridCol w="2764105"/>
-                <a:gridCol w="2764105"/>
-                <a:gridCol w="2764105"/>
+                <a:gridCol w="2764105">
+                  <a:extLst>
+                    <a:ext uri="{9D8B030D-6E8A-4147-A177-3AD203B41FA5}">
+                      <a16:colId xmlns:a16="http://schemas.microsoft.com/office/drawing/2014/main" val="20000"/>
+                    </a:ext>
+                  </a:extLst>
+                </a:gridCol>
+                <a:gridCol w="2764105">
+                  <a:extLst>
+                    <a:ext uri="{9D8B030D-6E8A-4147-A177-3AD203B41FA5}">
+                      <a16:colId xmlns:a16="http://schemas.microsoft.com/office/drawing/2014/main" val="20001"/>
+                    </a:ext>
+                  </a:extLst>
+                </a:gridCol>
+                <a:gridCol w="2764105">
+                  <a:extLst>
+                    <a:ext uri="{9D8B030D-6E8A-4147-A177-3AD203B41FA5}">
+                      <a16:colId xmlns:a16="http://schemas.microsoft.com/office/drawing/2014/main" val="20002"/>
+                    </a:ext>
+                  </a:extLst>
+                </a:gridCol>
+                <a:gridCol w="2764105">
+                  <a:extLst>
+                    <a:ext uri="{9D8B030D-6E8A-4147-A177-3AD203B41FA5}">
+                      <a16:colId xmlns:a16="http://schemas.microsoft.com/office/drawing/2014/main" val="20003"/>
+                    </a:ext>
+                  </a:extLst>
+                </a:gridCol>
               </a:tblGrid>
               <a:tr h="644435">
                 <a:tc>
@@ -1190,6 +1214,11 @@
                     </a:lnBlToTr>
                   </a:tcPr>
                 </a:tc>
+                <a:extLst>
+                  <a:ext uri="{0D108BD9-81ED-4DB2-BD59-A6C34878D82A}">
+                    <a16:rowId xmlns:a16="http://schemas.microsoft.com/office/drawing/2014/main" val="10000"/>
+                  </a:ext>
+                </a:extLst>
               </a:tr>
               <a:tr h="1225319">
                 <a:tc>
@@ -1421,6 +1450,11 @@
                     </a:lnBlToTr>
                   </a:tcPr>
                 </a:tc>
+                <a:extLst>
+                  <a:ext uri="{0D108BD9-81ED-4DB2-BD59-A6C34878D82A}">
+                    <a16:rowId xmlns:a16="http://schemas.microsoft.com/office/drawing/2014/main" val="10001"/>
+                  </a:ext>
+                </a:extLst>
               </a:tr>
               <a:tr h="1225319">
                 <a:tc>
@@ -1671,6 +1705,11 @@
                     </a:lnBlToTr>
                   </a:tcPr>
                 </a:tc>
+                <a:extLst>
+                  <a:ext uri="{0D108BD9-81ED-4DB2-BD59-A6C34878D82A}">
+                    <a16:rowId xmlns:a16="http://schemas.microsoft.com/office/drawing/2014/main" val="10002"/>
+                  </a:ext>
+                </a:extLst>
               </a:tr>
               <a:tr h="1225319">
                 <a:tc>
@@ -1921,6 +1960,11 @@
                     </a:lnBlToTr>
                   </a:tcPr>
                 </a:tc>
+                <a:extLst>
+                  <a:ext uri="{0D108BD9-81ED-4DB2-BD59-A6C34878D82A}">
+                    <a16:rowId xmlns:a16="http://schemas.microsoft.com/office/drawing/2014/main" val="10003"/>
+                  </a:ext>
+                </a:extLst>
               </a:tr>
             </a:tbl>
           </a:graphicData>
@@ -3914,10 +3958,34 @@
                 <a:tableStyleId>{93296810-A885-4BE3-A3E7-6D5BEEA58F35}</a:tableStyleId>
               </a:tblPr>
               <a:tblGrid>
-                <a:gridCol w="2764105"/>
-                <a:gridCol w="2764105"/>
-                <a:gridCol w="2764105"/>
-                <a:gridCol w="2764105"/>
+                <a:gridCol w="2764105">
+                  <a:extLst>
+                    <a:ext uri="{9D8B030D-6E8A-4147-A177-3AD203B41FA5}">
+                      <a16:colId xmlns:a16="http://schemas.microsoft.com/office/drawing/2014/main" val="20000"/>
+                    </a:ext>
+                  </a:extLst>
+                </a:gridCol>
+                <a:gridCol w="2764105">
+                  <a:extLst>
+                    <a:ext uri="{9D8B030D-6E8A-4147-A177-3AD203B41FA5}">
+                      <a16:colId xmlns:a16="http://schemas.microsoft.com/office/drawing/2014/main" val="20001"/>
+                    </a:ext>
+                  </a:extLst>
+                </a:gridCol>
+                <a:gridCol w="2764105">
+                  <a:extLst>
+                    <a:ext uri="{9D8B030D-6E8A-4147-A177-3AD203B41FA5}">
+                      <a16:colId xmlns:a16="http://schemas.microsoft.com/office/drawing/2014/main" val="20002"/>
+                    </a:ext>
+                  </a:extLst>
+                </a:gridCol>
+                <a:gridCol w="2764105">
+                  <a:extLst>
+                    <a:ext uri="{9D8B030D-6E8A-4147-A177-3AD203B41FA5}">
+                      <a16:colId xmlns:a16="http://schemas.microsoft.com/office/drawing/2014/main" val="20003"/>
+                    </a:ext>
+                  </a:extLst>
+                </a:gridCol>
               </a:tblGrid>
               <a:tr h="644435">
                 <a:tc>
@@ -4076,6 +4144,11 @@
                     </a:lnBlToTr>
                   </a:tcPr>
                 </a:tc>
+                <a:extLst>
+                  <a:ext uri="{0D108BD9-81ED-4DB2-BD59-A6C34878D82A}">
+                    <a16:rowId xmlns:a16="http://schemas.microsoft.com/office/drawing/2014/main" val="10000"/>
+                  </a:ext>
+                </a:extLst>
               </a:tr>
               <a:tr h="1225319">
                 <a:tc>
@@ -4291,6 +4364,11 @@
                     </a:lnBlToTr>
                   </a:tcPr>
                 </a:tc>
+                <a:extLst>
+                  <a:ext uri="{0D108BD9-81ED-4DB2-BD59-A6C34878D82A}">
+                    <a16:rowId xmlns:a16="http://schemas.microsoft.com/office/drawing/2014/main" val="10001"/>
+                  </a:ext>
+                </a:extLst>
               </a:tr>
               <a:tr h="1225319">
                 <a:tc>
@@ -4525,6 +4603,11 @@
                     </a:lnBlToTr>
                   </a:tcPr>
                 </a:tc>
+                <a:extLst>
+                  <a:ext uri="{0D108BD9-81ED-4DB2-BD59-A6C34878D82A}">
+                    <a16:rowId xmlns:a16="http://schemas.microsoft.com/office/drawing/2014/main" val="10002"/>
+                  </a:ext>
+                </a:extLst>
               </a:tr>
               <a:tr h="1225319">
                 <a:tc>
@@ -4759,6 +4842,11 @@
                     </a:lnBlToTr>
                   </a:tcPr>
                 </a:tc>
+                <a:extLst>
+                  <a:ext uri="{0D108BD9-81ED-4DB2-BD59-A6C34878D82A}">
+                    <a16:rowId xmlns:a16="http://schemas.microsoft.com/office/drawing/2014/main" val="10003"/>
+                  </a:ext>
+                </a:extLst>
               </a:tr>
             </a:tbl>
           </a:graphicData>
@@ -5631,10 +5719,34 @@
                 <a:tableStyleId>{21E4AEA4-8DFA-4A89-87EB-49C32662AFE0}</a:tableStyleId>
               </a:tblPr>
               <a:tblGrid>
-                <a:gridCol w="2764105"/>
-                <a:gridCol w="2764105"/>
-                <a:gridCol w="2764105"/>
-                <a:gridCol w="2764105"/>
+                <a:gridCol w="2764105">
+                  <a:extLst>
+                    <a:ext uri="{9D8B030D-6E8A-4147-A177-3AD203B41FA5}">
+                      <a16:colId xmlns:a16="http://schemas.microsoft.com/office/drawing/2014/main" val="20000"/>
+                    </a:ext>
+                  </a:extLst>
+                </a:gridCol>
+                <a:gridCol w="2764105">
+                  <a:extLst>
+                    <a:ext uri="{9D8B030D-6E8A-4147-A177-3AD203B41FA5}">
+                      <a16:colId xmlns:a16="http://schemas.microsoft.com/office/drawing/2014/main" val="20001"/>
+                    </a:ext>
+                  </a:extLst>
+                </a:gridCol>
+                <a:gridCol w="2764105">
+                  <a:extLst>
+                    <a:ext uri="{9D8B030D-6E8A-4147-A177-3AD203B41FA5}">
+                      <a16:colId xmlns:a16="http://schemas.microsoft.com/office/drawing/2014/main" val="20002"/>
+                    </a:ext>
+                  </a:extLst>
+                </a:gridCol>
+                <a:gridCol w="2764105">
+                  <a:extLst>
+                    <a:ext uri="{9D8B030D-6E8A-4147-A177-3AD203B41FA5}">
+                      <a16:colId xmlns:a16="http://schemas.microsoft.com/office/drawing/2014/main" val="20003"/>
+                    </a:ext>
+                  </a:extLst>
+                </a:gridCol>
               </a:tblGrid>
               <a:tr h="644435">
                 <a:tc>
@@ -5805,6 +5917,11 @@
                     </a:solidFill>
                   </a:tcPr>
                 </a:tc>
+                <a:extLst>
+                  <a:ext uri="{0D108BD9-81ED-4DB2-BD59-A6C34878D82A}">
+                    <a16:rowId xmlns:a16="http://schemas.microsoft.com/office/drawing/2014/main" val="10000"/>
+                  </a:ext>
+                </a:extLst>
               </a:tr>
               <a:tr h="1225319">
                 <a:tc>
@@ -6032,6 +6149,11 @@
                     </a:solidFill>
                   </a:tcPr>
                 </a:tc>
+                <a:extLst>
+                  <a:ext uri="{0D108BD9-81ED-4DB2-BD59-A6C34878D82A}">
+                    <a16:rowId xmlns:a16="http://schemas.microsoft.com/office/drawing/2014/main" val="10001"/>
+                  </a:ext>
+                </a:extLst>
               </a:tr>
               <a:tr h="1225319">
                 <a:tc>
@@ -6286,6 +6408,11 @@
                     </a:solidFill>
                   </a:tcPr>
                 </a:tc>
+                <a:extLst>
+                  <a:ext uri="{0D108BD9-81ED-4DB2-BD59-A6C34878D82A}">
+                    <a16:rowId xmlns:a16="http://schemas.microsoft.com/office/drawing/2014/main" val="10002"/>
+                  </a:ext>
+                </a:extLst>
               </a:tr>
               <a:tr h="1225319">
                 <a:tc>
@@ -6532,6 +6659,11 @@
                     </a:solidFill>
                   </a:tcPr>
                 </a:tc>
+                <a:extLst>
+                  <a:ext uri="{0D108BD9-81ED-4DB2-BD59-A6C34878D82A}">
+                    <a16:rowId xmlns:a16="http://schemas.microsoft.com/office/drawing/2014/main" val="10003"/>
+                  </a:ext>
+                </a:extLst>
               </a:tr>
             </a:tbl>
           </a:graphicData>
@@ -7513,10 +7645,34 @@
                 <a:tableStyleId>{5C22544A-7EE6-4342-B048-85BDC9FD1C3A}</a:tableStyleId>
               </a:tblPr>
               <a:tblGrid>
-                <a:gridCol w="2764105"/>
-                <a:gridCol w="2764105"/>
-                <a:gridCol w="2764105"/>
-                <a:gridCol w="2764105"/>
+                <a:gridCol w="2764105">
+                  <a:extLst>
+                    <a:ext uri="{9D8B030D-6E8A-4147-A177-3AD203B41FA5}">
+                      <a16:colId xmlns:a16="http://schemas.microsoft.com/office/drawing/2014/main" val="20000"/>
+                    </a:ext>
+                  </a:extLst>
+                </a:gridCol>
+                <a:gridCol w="2764105">
+                  <a:extLst>
+                    <a:ext uri="{9D8B030D-6E8A-4147-A177-3AD203B41FA5}">
+                      <a16:colId xmlns:a16="http://schemas.microsoft.com/office/drawing/2014/main" val="20001"/>
+                    </a:ext>
+                  </a:extLst>
+                </a:gridCol>
+                <a:gridCol w="2764105">
+                  <a:extLst>
+                    <a:ext uri="{9D8B030D-6E8A-4147-A177-3AD203B41FA5}">
+                      <a16:colId xmlns:a16="http://schemas.microsoft.com/office/drawing/2014/main" val="20002"/>
+                    </a:ext>
+                  </a:extLst>
+                </a:gridCol>
+                <a:gridCol w="2764105">
+                  <a:extLst>
+                    <a:ext uri="{9D8B030D-6E8A-4147-A177-3AD203B41FA5}">
+                      <a16:colId xmlns:a16="http://schemas.microsoft.com/office/drawing/2014/main" val="20003"/>
+                    </a:ext>
+                  </a:extLst>
+                </a:gridCol>
               </a:tblGrid>
               <a:tr h="644435">
                 <a:tc>
@@ -7691,6 +7847,11 @@
                     </a:lnBlToTr>
                   </a:tcPr>
                 </a:tc>
+                <a:extLst>
+                  <a:ext uri="{0D108BD9-81ED-4DB2-BD59-A6C34878D82A}">
+                    <a16:rowId xmlns:a16="http://schemas.microsoft.com/office/drawing/2014/main" val="10000"/>
+                  </a:ext>
+                </a:extLst>
               </a:tr>
               <a:tr h="1225319">
                 <a:tc>
@@ -7922,6 +8083,11 @@
                     </a:lnBlToTr>
                   </a:tcPr>
                 </a:tc>
+                <a:extLst>
+                  <a:ext uri="{0D108BD9-81ED-4DB2-BD59-A6C34878D82A}">
+                    <a16:rowId xmlns:a16="http://schemas.microsoft.com/office/drawing/2014/main" val="10001"/>
+                  </a:ext>
+                </a:extLst>
               </a:tr>
               <a:tr h="1225319">
                 <a:tc>
@@ -8172,6 +8338,11 @@
                     </a:lnBlToTr>
                   </a:tcPr>
                 </a:tc>
+                <a:extLst>
+                  <a:ext uri="{0D108BD9-81ED-4DB2-BD59-A6C34878D82A}">
+                    <a16:rowId xmlns:a16="http://schemas.microsoft.com/office/drawing/2014/main" val="10002"/>
+                  </a:ext>
+                </a:extLst>
               </a:tr>
               <a:tr h="1225319">
                 <a:tc>
@@ -8422,6 +8593,11 @@
                     </a:lnBlToTr>
                   </a:tcPr>
                 </a:tc>
+                <a:extLst>
+                  <a:ext uri="{0D108BD9-81ED-4DB2-BD59-A6C34878D82A}">
+                    <a16:rowId xmlns:a16="http://schemas.microsoft.com/office/drawing/2014/main" val="10003"/>
+                  </a:ext>
+                </a:extLst>
               </a:tr>
             </a:tbl>
           </a:graphicData>
@@ -9403,10 +9579,34 @@
                 <a:tableStyleId>{5C22544A-7EE6-4342-B048-85BDC9FD1C3A}</a:tableStyleId>
               </a:tblPr>
               <a:tblGrid>
-                <a:gridCol w="2764105"/>
-                <a:gridCol w="2764105"/>
-                <a:gridCol w="2764105"/>
-                <a:gridCol w="2764105"/>
+                <a:gridCol w="2764105">
+                  <a:extLst>
+                    <a:ext uri="{9D8B030D-6E8A-4147-A177-3AD203B41FA5}">
+                      <a16:colId xmlns:a16="http://schemas.microsoft.com/office/drawing/2014/main" val="20000"/>
+                    </a:ext>
+                  </a:extLst>
+                </a:gridCol>
+                <a:gridCol w="2764105">
+                  <a:extLst>
+                    <a:ext uri="{9D8B030D-6E8A-4147-A177-3AD203B41FA5}">
+                      <a16:colId xmlns:a16="http://schemas.microsoft.com/office/drawing/2014/main" val="20001"/>
+                    </a:ext>
+                  </a:extLst>
+                </a:gridCol>
+                <a:gridCol w="2764105">
+                  <a:extLst>
+                    <a:ext uri="{9D8B030D-6E8A-4147-A177-3AD203B41FA5}">
+                      <a16:colId xmlns:a16="http://schemas.microsoft.com/office/drawing/2014/main" val="20002"/>
+                    </a:ext>
+                  </a:extLst>
+                </a:gridCol>
+                <a:gridCol w="2764105">
+                  <a:extLst>
+                    <a:ext uri="{9D8B030D-6E8A-4147-A177-3AD203B41FA5}">
+                      <a16:colId xmlns:a16="http://schemas.microsoft.com/office/drawing/2014/main" val="20003"/>
+                    </a:ext>
+                  </a:extLst>
+                </a:gridCol>
               </a:tblGrid>
               <a:tr h="644435">
                 <a:tc>
@@ -9581,6 +9781,11 @@
                     </a:lnBlToTr>
                   </a:tcPr>
                 </a:tc>
+                <a:extLst>
+                  <a:ext uri="{0D108BD9-81ED-4DB2-BD59-A6C34878D82A}">
+                    <a16:rowId xmlns:a16="http://schemas.microsoft.com/office/drawing/2014/main" val="10000"/>
+                  </a:ext>
+                </a:extLst>
               </a:tr>
               <a:tr h="1225319">
                 <a:tc>
@@ -9812,6 +10017,11 @@
                     </a:lnBlToTr>
                   </a:tcPr>
                 </a:tc>
+                <a:extLst>
+                  <a:ext uri="{0D108BD9-81ED-4DB2-BD59-A6C34878D82A}">
+                    <a16:rowId xmlns:a16="http://schemas.microsoft.com/office/drawing/2014/main" val="10001"/>
+                  </a:ext>
+                </a:extLst>
               </a:tr>
               <a:tr h="1225319">
                 <a:tc>
@@ -10062,6 +10272,11 @@
                     </a:lnBlToTr>
                   </a:tcPr>
                 </a:tc>
+                <a:extLst>
+                  <a:ext uri="{0D108BD9-81ED-4DB2-BD59-A6C34878D82A}">
+                    <a16:rowId xmlns:a16="http://schemas.microsoft.com/office/drawing/2014/main" val="10002"/>
+                  </a:ext>
+                </a:extLst>
               </a:tr>
               <a:tr h="1225319">
                 <a:tc>
@@ -10312,6 +10527,11 @@
                     </a:lnBlToTr>
                   </a:tcPr>
                 </a:tc>
+                <a:extLst>
+                  <a:ext uri="{0D108BD9-81ED-4DB2-BD59-A6C34878D82A}">
+                    <a16:rowId xmlns:a16="http://schemas.microsoft.com/office/drawing/2014/main" val="10003"/>
+                  </a:ext>
+                </a:extLst>
               </a:tr>
             </a:tbl>
           </a:graphicData>
@@ -17286,6 +17506,30 @@
           <a:chExt cx="0" cy="0"/>
         </a:xfrm>
       </p:grpSpPr>
+      <p:pic>
+        <p:nvPicPr>
+          <p:cNvPr id="6" name="Picture 5"/>
+          <p:cNvPicPr>
+            <a:picLocks noChangeAspect="1"/>
+          </p:cNvPicPr>
+          <p:nvPr/>
+        </p:nvPicPr>
+        <p:blipFill>
+          <a:blip r:embed="rId2"/>
+          <a:stretch>
+            <a:fillRect/>
+          </a:stretch>
+        </p:blipFill>
+        <p:spPr>
+          <a:xfrm>
+            <a:off x="4956187" y="1620480"/>
+            <a:ext cx="4561506" cy="3108960"/>
+          </a:xfrm>
+          <a:prstGeom prst="rect">
+            <a:avLst/>
+          </a:prstGeom>
+        </p:spPr>
+      </p:pic>
       <p:sp>
         <p:nvSpPr>
           <p:cNvPr id="4" name="Title 3"/>
@@ -17387,28 +17631,22 @@
       </p:sp>
       <p:pic>
         <p:nvPicPr>
-          <p:cNvPr id="7" name="Picture 6"/>
+          <p:cNvPr id="10" name="Picture 9"/>
           <p:cNvPicPr>
             <a:picLocks noChangeAspect="1"/>
           </p:cNvPicPr>
           <p:nvPr/>
         </p:nvPicPr>
         <p:blipFill>
-          <a:blip r:embed="rId2">
-            <a:extLst>
-              <a:ext uri="{28A0092B-C50C-407E-A947-70E740481C1C}">
-                <a14:useLocalDpi xmlns:a14="http://schemas.microsoft.com/office/drawing/2010/main" val="0"/>
-              </a:ext>
-            </a:extLst>
-          </a:blip>
+          <a:blip r:embed="rId3"/>
           <a:stretch>
             <a:fillRect/>
           </a:stretch>
         </p:blipFill>
         <p:spPr>
           <a:xfrm>
-            <a:off x="5621118" y="1198486"/>
-            <a:ext cx="4572000" cy="3266917"/>
+            <a:off x="6785681" y="1862827"/>
+            <a:ext cx="4706381" cy="3108960"/>
           </a:xfrm>
           <a:prstGeom prst="rect">
             <a:avLst/>
@@ -17417,58 +17655,22 @@
       </p:pic>
       <p:pic>
         <p:nvPicPr>
-          <p:cNvPr id="9" name="Picture 8"/>
+          <p:cNvPr id="3" name="Picture 2"/>
           <p:cNvPicPr>
             <a:picLocks noChangeAspect="1"/>
           </p:cNvPicPr>
           <p:nvPr/>
         </p:nvPicPr>
         <p:blipFill>
-          <a:blip r:embed="rId3" cstate="print">
-            <a:extLst>
-              <a:ext uri="{28A0092B-C50C-407E-A947-70E740481C1C}">
-                <a14:useLocalDpi xmlns:a14="http://schemas.microsoft.com/office/drawing/2010/main" val="0"/>
-              </a:ext>
-            </a:extLst>
-          </a:blip>
+          <a:blip r:embed="rId4"/>
           <a:stretch>
             <a:fillRect/>
           </a:stretch>
         </p:blipFill>
         <p:spPr>
           <a:xfrm>
-            <a:off x="7201205" y="2002789"/>
-            <a:ext cx="4572000" cy="3007377"/>
-          </a:xfrm>
-          <a:prstGeom prst="rect">
-            <a:avLst/>
-          </a:prstGeom>
-        </p:spPr>
-      </p:pic>
-      <p:pic>
-        <p:nvPicPr>
-          <p:cNvPr id="8" name="Picture 7"/>
-          <p:cNvPicPr>
-            <a:picLocks noChangeAspect="1"/>
-          </p:cNvPicPr>
-          <p:nvPr/>
-        </p:nvPicPr>
-        <p:blipFill>
-          <a:blip r:embed="rId4" cstate="print">
-            <a:extLst>
-              <a:ext uri="{28A0092B-C50C-407E-A947-70E740481C1C}">
-                <a14:useLocalDpi xmlns:a14="http://schemas.microsoft.com/office/drawing/2010/main" val="0"/>
-              </a:ext>
-            </a:extLst>
-          </a:blip>
-          <a:stretch>
-            <a:fillRect/>
-          </a:stretch>
-        </p:blipFill>
-        <p:spPr>
-          <a:xfrm>
-            <a:off x="10325703" y="2522549"/>
-            <a:ext cx="1737360" cy="3163215"/>
+            <a:off x="10228602" y="2103707"/>
+            <a:ext cx="1737360" cy="3169250"/>
           </a:xfrm>
           <a:prstGeom prst="rect">
             <a:avLst/>
@@ -17548,7 +17750,11 @@
           <a:p>
             <a:r>
               <a:rPr lang="en-US" dirty="0" smtClean="0"/>
-              <a:t>Bootstrap Grid system</a:t>
+              <a:t>Bootstrap Grid </a:t>
+            </a:r>
+            <a:r>
+              <a:rPr lang="en-US" dirty="0" smtClean="0"/>
+              <a:t>System</a:t>
             </a:r>
             <a:endParaRPr lang="en-US" dirty="0"/>
           </a:p>
@@ -17585,39 +17791,40 @@
           <a:p>
             <a:r>
               <a:rPr lang="en-US" dirty="0"/>
-              <a:t>There are four grids</a:t>
+              <a:t>There are four </a:t>
+            </a:r>
+            <a:r>
+              <a:rPr lang="en-US" dirty="0" smtClean="0"/>
+              <a:t>grids; one for </a:t>
+            </a:r>
+            <a:r>
+              <a:rPr lang="en-US" dirty="0"/>
+              <a:t>each screen size</a:t>
             </a:r>
           </a:p>
           <a:p>
             <a:pPr lvl="1"/>
-            <a:r>
-              <a:rPr lang="en-US" dirty="0"/>
-              <a:t>One grid for each screen size</a:t>
-            </a:r>
-          </a:p>
-          <a:p>
-            <a:pPr lvl="2"/>
             <a:r>
               <a:rPr lang="en-US" dirty="0"/>
               <a:t>Large (1200px and higher)</a:t>
             </a:r>
           </a:p>
           <a:p>
-            <a:pPr lvl="2"/>
+            <a:pPr lvl="1"/>
             <a:r>
               <a:rPr lang="en-US" dirty="0"/>
               <a:t>Medium (992px-1200px)</a:t>
             </a:r>
           </a:p>
           <a:p>
-            <a:pPr lvl="2"/>
+            <a:pPr lvl="1"/>
             <a:r>
               <a:rPr lang="en-US" dirty="0"/>
               <a:t>Small (768px-991px)</a:t>
             </a:r>
           </a:p>
           <a:p>
-            <a:pPr lvl="2"/>
+            <a:pPr lvl="1"/>
             <a:r>
               <a:rPr lang="en-US" dirty="0"/>
               <a:t>Extra small (less than 768px)</a:t>
@@ -17701,7 +17908,11 @@
           <a:p>
             <a:r>
               <a:rPr lang="en-US" dirty="0" smtClean="0"/>
-              <a:t>Bootstrap Grid system</a:t>
+              <a:t>Bootstrap Grid </a:t>
+            </a:r>
+            <a:r>
+              <a:rPr lang="en-US" dirty="0" smtClean="0"/>
+              <a:t>System</a:t>
             </a:r>
             <a:endParaRPr lang="en-US" dirty="0"/>
           </a:p>
@@ -17728,13 +17939,55 @@
                 <a:tableStyleId>{125E5076-3810-47DD-B79F-674D7AD40C01}</a:tableStyleId>
               </a:tblPr>
               <a:tblGrid>
-                <a:gridCol w="1990150"/>
-                <a:gridCol w="2504160"/>
-                <a:gridCol w="2109436"/>
-                <a:gridCol w="137719"/>
-                <a:gridCol w="2189036"/>
-                <a:gridCol w="116840"/>
-                <a:gridCol w="2247155"/>
+                <a:gridCol w="1990150">
+                  <a:extLst>
+                    <a:ext uri="{9D8B030D-6E8A-4147-A177-3AD203B41FA5}">
+                      <a16:colId xmlns:a16="http://schemas.microsoft.com/office/drawing/2014/main" val="20000"/>
+                    </a:ext>
+                  </a:extLst>
+                </a:gridCol>
+                <a:gridCol w="2504160">
+                  <a:extLst>
+                    <a:ext uri="{9D8B030D-6E8A-4147-A177-3AD203B41FA5}">
+                      <a16:colId xmlns:a16="http://schemas.microsoft.com/office/drawing/2014/main" val="20001"/>
+                    </a:ext>
+                  </a:extLst>
+                </a:gridCol>
+                <a:gridCol w="2109436">
+                  <a:extLst>
+                    <a:ext uri="{9D8B030D-6E8A-4147-A177-3AD203B41FA5}">
+                      <a16:colId xmlns:a16="http://schemas.microsoft.com/office/drawing/2014/main" val="20002"/>
+                    </a:ext>
+                  </a:extLst>
+                </a:gridCol>
+                <a:gridCol w="137719">
+                  <a:extLst>
+                    <a:ext uri="{9D8B030D-6E8A-4147-A177-3AD203B41FA5}">
+                      <a16:colId xmlns:a16="http://schemas.microsoft.com/office/drawing/2014/main" val="20003"/>
+                    </a:ext>
+                  </a:extLst>
+                </a:gridCol>
+                <a:gridCol w="2189036">
+                  <a:extLst>
+                    <a:ext uri="{9D8B030D-6E8A-4147-A177-3AD203B41FA5}">
+                      <a16:colId xmlns:a16="http://schemas.microsoft.com/office/drawing/2014/main" val="20004"/>
+                    </a:ext>
+                  </a:extLst>
+                </a:gridCol>
+                <a:gridCol w="116840">
+                  <a:extLst>
+                    <a:ext uri="{9D8B030D-6E8A-4147-A177-3AD203B41FA5}">
+                      <a16:colId xmlns:a16="http://schemas.microsoft.com/office/drawing/2014/main" val="20005"/>
+                    </a:ext>
+                  </a:extLst>
+                </a:gridCol>
+                <a:gridCol w="2247155">
+                  <a:extLst>
+                    <a:ext uri="{9D8B030D-6E8A-4147-A177-3AD203B41FA5}">
+                      <a16:colId xmlns:a16="http://schemas.microsoft.com/office/drawing/2014/main" val="20006"/>
+                    </a:ext>
+                  </a:extLst>
+                </a:gridCol>
               </a:tblGrid>
               <a:tr h="847322">
                 <a:tc>
@@ -17839,6 +18092,11 @@
                   </a:txBody>
                   <a:tcPr anchor="ctr"/>
                 </a:tc>
+                <a:extLst>
+                  <a:ext uri="{0D108BD9-81ED-4DB2-BD59-A6C34878D82A}">
+                    <a16:rowId xmlns:a16="http://schemas.microsoft.com/office/drawing/2014/main" val="10000"/>
+                  </a:ext>
+                </a:extLst>
               </a:tr>
               <a:tr h="502011">
                 <a:tc>
@@ -17935,6 +18193,11 @@
                   </a:txBody>
                   <a:tcPr/>
                 </a:tc>
+                <a:extLst>
+                  <a:ext uri="{0D108BD9-81ED-4DB2-BD59-A6C34878D82A}">
+                    <a16:rowId xmlns:a16="http://schemas.microsoft.com/office/drawing/2014/main" val="10001"/>
+                  </a:ext>
+                </a:extLst>
               </a:tr>
               <a:tr h="484184">
                 <a:tc>
@@ -17979,10 +18242,10 @@
                     <a:lstStyle/>
                     <a:p>
                       <a:r>
-                        <a:rPr lang="en-US"/>
+                        <a:rPr lang="en-US" dirty="0"/>
                         <a:t>750px</a:t>
                       </a:r>
-                      <a:endParaRPr lang="en-US">
+                      <a:endParaRPr lang="en-US" dirty="0">
                         <a:solidFill>
                           <a:srgbClr val="0171B0"/>
                         </a:solidFill>
@@ -18047,6 +18310,11 @@
                   </a:txBody>
                   <a:tcPr anchor="ctr"/>
                 </a:tc>
+                <a:extLst>
+                  <a:ext uri="{0D108BD9-81ED-4DB2-BD59-A6C34878D82A}">
+                    <a16:rowId xmlns:a16="http://schemas.microsoft.com/office/drawing/2014/main" val="10002"/>
+                  </a:ext>
+                </a:extLst>
               </a:tr>
               <a:tr h="484184">
                 <a:tc>
@@ -18055,10 +18323,10 @@
                     <a:lstStyle/>
                     <a:p>
                       <a:r>
-                        <a:rPr lang="en-US"/>
+                        <a:rPr lang="en-US" dirty="0"/>
                         <a:t>Class prefix</a:t>
                       </a:r>
-                      <a:endParaRPr lang="en-US">
+                      <a:endParaRPr lang="en-US" dirty="0">
                         <a:solidFill>
                           <a:srgbClr val="0171B0"/>
                         </a:solidFill>
@@ -18183,6 +18451,11 @@
                   </a:txBody>
                   <a:tcPr anchor="ctr"/>
                 </a:tc>
+                <a:extLst>
+                  <a:ext uri="{0D108BD9-81ED-4DB2-BD59-A6C34878D82A}">
+                    <a16:rowId xmlns:a16="http://schemas.microsoft.com/office/drawing/2014/main" val="10003"/>
+                  </a:ext>
+                </a:extLst>
               </a:tr>
               <a:tr h="484184">
                 <a:tc>
@@ -18271,6 +18544,11 @@
                   </a:txBody>
                   <a:tcPr/>
                 </a:tc>
+                <a:extLst>
+                  <a:ext uri="{0D108BD9-81ED-4DB2-BD59-A6C34878D82A}">
+                    <a16:rowId xmlns:a16="http://schemas.microsoft.com/office/drawing/2014/main" val="10004"/>
+                  </a:ext>
+                </a:extLst>
               </a:tr>
               <a:tr h="484184">
                 <a:tc>
@@ -18279,10 +18557,10 @@
                     <a:lstStyle/>
                     <a:p>
                       <a:r>
-                        <a:rPr lang="en-US"/>
+                        <a:rPr lang="en-US" dirty="0"/>
                         <a:t>Column width</a:t>
                       </a:r>
-                      <a:endParaRPr lang="en-US">
+                      <a:endParaRPr lang="en-US" dirty="0">
                         <a:solidFill>
                           <a:srgbClr val="0171B0"/>
                         </a:solidFill>
@@ -18383,6 +18661,11 @@
                   </a:txBody>
                   <a:tcPr anchor="ctr"/>
                 </a:tc>
+                <a:extLst>
+                  <a:ext uri="{0D108BD9-81ED-4DB2-BD59-A6C34878D82A}">
+                    <a16:rowId xmlns:a16="http://schemas.microsoft.com/office/drawing/2014/main" val="10005"/>
+                  </a:ext>
+                </a:extLst>
               </a:tr>
               <a:tr h="484184">
                 <a:tc>
@@ -18391,10 +18674,10 @@
                     <a:lstStyle/>
                     <a:p>
                       <a:r>
-                        <a:rPr lang="en-US"/>
+                        <a:rPr lang="en-US" dirty="0"/>
                         <a:t>Gutter width</a:t>
                       </a:r>
-                      <a:endParaRPr lang="en-US">
+                      <a:endParaRPr lang="en-US" dirty="0">
                         <a:solidFill>
                           <a:srgbClr val="0171B0"/>
                         </a:solidFill>
@@ -18471,6 +18754,11 @@
                   </a:txBody>
                   <a:tcPr/>
                 </a:tc>
+                <a:extLst>
+                  <a:ext uri="{0D108BD9-81ED-4DB2-BD59-A6C34878D82A}">
+                    <a16:rowId xmlns:a16="http://schemas.microsoft.com/office/drawing/2014/main" val="10006"/>
+                  </a:ext>
+                </a:extLst>
               </a:tr>
             </a:tbl>
           </a:graphicData>
@@ -18687,7 +18975,11 @@
           <a:p>
             <a:r>
               <a:rPr lang="en-US" dirty="0" smtClean="0"/>
-              <a:t>Bootstrap components</a:t>
+              <a:t>Bootstrap </a:t>
+            </a:r>
+            <a:r>
+              <a:rPr lang="en-US" dirty="0" smtClean="0"/>
+              <a:t>Components</a:t>
             </a:r>
             <a:endParaRPr lang="en-US" dirty="0"/>
           </a:p>
@@ -18777,7 +19069,7 @@
           </p:blipFill>
           <p:spPr>
             <a:xfrm>
-              <a:off x="917930" y="1642127"/>
+              <a:off x="917930" y="1657367"/>
               <a:ext cx="2148655" cy="383689"/>
             </a:xfrm>
             <a:prstGeom prst="rect">
@@ -18807,7 +19099,7 @@
           </p:blipFill>
           <p:spPr>
             <a:xfrm>
-              <a:off x="917930" y="1167090"/>
+              <a:off x="917930" y="1136610"/>
               <a:ext cx="4334471" cy="476315"/>
             </a:xfrm>
             <a:prstGeom prst="rect">
@@ -19093,7 +19385,23 @@
           <a:p>
             <a:r>
               <a:rPr lang="en-US" dirty="0" smtClean="0"/>
-              <a:t>Bootstrap - Visual Studio support</a:t>
+              <a:t>Bootstrap </a:t>
+            </a:r>
+            <a:r>
+              <a:rPr lang="en-US" dirty="0"/>
+              <a:t>– </a:t>
+            </a:r>
+            <a:r>
+              <a:rPr lang="en-US" dirty="0" smtClean="0"/>
+              <a:t>Visual Studio </a:t>
+            </a:r>
+            <a:r>
+              <a:rPr lang="en-US" dirty="0"/>
+              <a:t>S</a:t>
+            </a:r>
+            <a:r>
+              <a:rPr lang="en-US" dirty="0" smtClean="0"/>
+              <a:t>upport</a:t>
             </a:r>
             <a:endParaRPr lang="en-US" dirty="0"/>
           </a:p>
@@ -19303,50 +19611,46 @@
                   <a:srgbClr val="48BAE7"/>
                 </a:solidFill>
               </a:rPr>
-              <a:t>http://getbootstrap.com/</a:t>
-            </a:r>
+              <a:t>http://getbootstrap.com</a:t>
+            </a:r>
+            <a:r>
+              <a:rPr lang="en-US" u="sng" dirty="0" smtClean="0">
+                <a:solidFill>
+                  <a:srgbClr val="48BAE7"/>
+                </a:solidFill>
+              </a:rPr>
+              <a:t>/</a:t>
+            </a:r>
+            <a:endParaRPr lang="en-US" u="sng" dirty="0">
+              <a:solidFill>
+                <a:srgbClr val="48BAE7"/>
+              </a:solidFill>
+            </a:endParaRPr>
           </a:p>
         </p:txBody>
       </p:sp>
       <p:pic>
         <p:nvPicPr>
-          <p:cNvPr id="26626" name="Picture 2" descr="C:\Users\mvazquez\AppData\Local\Temp\SNAGHTML70c7c8c.PNG"/>
+          <p:cNvPr id="3" name="Picture 2"/>
           <p:cNvPicPr>
-            <a:picLocks noChangeAspect="1" noChangeArrowheads="1"/>
+            <a:picLocks noChangeAspect="1"/>
           </p:cNvPicPr>
           <p:nvPr/>
         </p:nvPicPr>
         <p:blipFill>
-          <a:blip r:embed="rId2">
-            <a:extLst>
-              <a:ext uri="{28A0092B-C50C-407E-A947-70E740481C1C}">
-                <a14:useLocalDpi xmlns:a14="http://schemas.microsoft.com/office/drawing/2010/main" val="0"/>
-              </a:ext>
-            </a:extLst>
-          </a:blip>
-          <a:srcRect/>
+          <a:blip r:embed="rId2"/>
           <a:stretch>
             <a:fillRect/>
           </a:stretch>
         </p:blipFill>
-        <p:spPr bwMode="auto">
+        <p:spPr>
           <a:xfrm>
-            <a:off x="647700" y="1332484"/>
-            <a:ext cx="10972800" cy="9100249"/>
+            <a:off x="1478280" y="1134080"/>
+            <a:ext cx="9235440" cy="5834795"/>
           </a:xfrm>
           <a:prstGeom prst="rect">
             <a:avLst/>
           </a:prstGeom>
-          <a:noFill/>
-          <a:extLst>
-            <a:ext uri="{909E8E84-426E-40DD-AFC4-6F175D3DCCD1}">
-              <a14:hiddenFill xmlns:a14="http://schemas.microsoft.com/office/drawing/2010/main">
-                <a:solidFill>
-                  <a:srgbClr val="FFFFFF"/>
-                </a:solidFill>
-              </a14:hiddenFill>
-            </a:ext>
-          </a:extLst>
         </p:spPr>
       </p:pic>
     </p:spTree>
@@ -19650,7 +19954,11 @@
             </a:pPr>
             <a:r>
               <a:rPr lang="en-GB" dirty="0" smtClean="0"/>
-              <a:t>Jade Templates</a:t>
+              <a:t>Implementing </a:t>
+            </a:r>
+            <a:r>
+              <a:rPr lang="en-GB" dirty="0" smtClean="0"/>
+              <a:t>Bootstrap</a:t>
             </a:r>
           </a:p>
           <a:p>
@@ -19660,8 +19968,13 @@
             </a:pPr>
             <a:r>
               <a:rPr lang="en-GB" dirty="0" smtClean="0"/>
-              <a:t>Implementing Bootstrap</a:t>
-            </a:r>
+              <a:t>Demo: </a:t>
+            </a:r>
+            <a:r>
+              <a:rPr lang="en-US" dirty="0"/>
+              <a:t>Using Jade Templates with Bootstrap</a:t>
+            </a:r>
+            <a:endParaRPr lang="en-GB" dirty="0" smtClean="0"/>
           </a:p>
           <a:p>
             <a:pPr marL="742950" indent="-742950">
@@ -19670,7 +19983,11 @@
             </a:pPr>
             <a:r>
               <a:rPr lang="en-GB" dirty="0" smtClean="0"/>
-              <a:t>Creating the chat UI </a:t>
+              <a:t>Demo: Creating </a:t>
+            </a:r>
+            <a:r>
+              <a:rPr lang="en-GB" dirty="0" smtClean="0"/>
+              <a:t>the chat UI </a:t>
             </a:r>
           </a:p>
         </p:txBody>
@@ -19835,34 +20152,41 @@
         <p:spPr/>
         <p:txBody>
           <a:bodyPr>
-            <a:normAutofit fontScale="92500"/>
+            <a:normAutofit lnSpcReduction="10000"/>
           </a:bodyPr>
           <a:lstStyle/>
           <a:p>
             <a:r>
               <a:rPr lang="en-US" dirty="0" smtClean="0"/>
-              <a:t>Jade is a </a:t>
-            </a:r>
-            <a:r>
-              <a:rPr lang="en-US" dirty="0" err="1" smtClean="0"/>
-              <a:t>templating</a:t>
+              <a:t>Jade is a templating language to simplify writing </a:t>
             </a:r>
             <a:r>
               <a:rPr lang="en-US" dirty="0" smtClean="0"/>
-              <a:t> language to simplify writing HTML.</a:t>
-            </a:r>
+              <a:t>HTML</a:t>
+            </a:r>
+            <a:endParaRPr lang="en-US" dirty="0" smtClean="0"/>
           </a:p>
           <a:p>
             <a:r>
               <a:rPr lang="en-US" dirty="0" smtClean="0"/>
-              <a:t>Jade syntax and keywords map directly to HTML. </a:t>
-            </a:r>
-          </a:p>
-          <a:p>
+              <a:t>Jade syntax and keywords map directly to </a:t>
+            </a:r>
             <a:r>
               <a:rPr lang="en-US" dirty="0" smtClean="0"/>
-              <a:t>Jade adds the ability to separate and extend your HTML.</a:t>
-            </a:r>
+              <a:t>HTML</a:t>
+            </a:r>
+            <a:endParaRPr lang="en-US" dirty="0" smtClean="0"/>
+          </a:p>
+          <a:p>
+            <a:r>
+              <a:rPr lang="en-US" dirty="0" smtClean="0"/>
+              <a:t>Jade adds the ability to separate and extend your </a:t>
+            </a:r>
+            <a:r>
+              <a:rPr lang="en-US" dirty="0" smtClean="0"/>
+              <a:t>HTML</a:t>
+            </a:r>
+            <a:endParaRPr lang="en-US" dirty="0" smtClean="0"/>
           </a:p>
           <a:p>
             <a:pPr lvl="1"/>
@@ -19875,14 +20199,23 @@
             <a:pPr lvl="1"/>
             <a:r>
               <a:rPr lang="en-US" dirty="0" smtClean="0"/>
-              <a:t>Ensures clean HTML is generated.</a:t>
-            </a:r>
+              <a:t>Ensures clean HTML is </a:t>
+            </a:r>
+            <a:r>
+              <a:rPr lang="en-US" dirty="0" smtClean="0"/>
+              <a:t>generated</a:t>
+            </a:r>
+            <a:endParaRPr lang="en-US" dirty="0" smtClean="0"/>
           </a:p>
           <a:p>
             <a:pPr lvl="1"/>
             <a:r>
               <a:rPr lang="en-US" dirty="0" smtClean="0"/>
-              <a:t>Allows you to insert values into HTML through templates. </a:t>
+              <a:t>Allows you to insert values into HTML through </a:t>
+            </a:r>
+            <a:r>
+              <a:rPr lang="en-US" dirty="0" smtClean="0"/>
+              <a:t>templates</a:t>
             </a:r>
             <a:endParaRPr lang="en-US" dirty="0"/>
           </a:p>
@@ -21605,19 +21938,7 @@
             </a:pPr>
             <a:r>
               <a:rPr lang="en-US" dirty="0" smtClean="0"/>
-              <a:t>The block keyword allows you to establish </a:t>
-            </a:r>
-            <a:r>
-              <a:rPr lang="en-US" smtClean="0"/>
-              <a:t>a block or </a:t>
-            </a:r>
-            <a:r>
-              <a:rPr lang="en-US" dirty="0" smtClean="0"/>
-              <a:t>replace the content of </a:t>
-            </a:r>
-            <a:r>
-              <a:rPr lang="en-US" smtClean="0"/>
-              <a:t>pre-defined blocks.</a:t>
+              <a:t>The block keyword allows you to establish a block or replace the content of pre-defined blocks.</a:t>
             </a:r>
             <a:endParaRPr lang="en-US" dirty="0"/>
           </a:p>
@@ -21688,7 +22009,11 @@
           <a:lstStyle/>
           <a:p>
             <a:r>
-              <a:rPr lang="en-US" dirty="0" smtClean="0"/>
+              <a:rPr lang="en-GB" dirty="0"/>
+              <a:t>Implementing </a:t>
+            </a:r>
+            <a:r>
+              <a:rPr lang="en-GB" dirty="0" smtClean="0"/>
               <a:t>Bootstrap</a:t>
             </a:r>
             <a:endParaRPr lang="en-US" dirty="0"/>
@@ -21811,7 +22136,15 @@
             <a:pPr lvl="0" fontAlgn="ctr"/>
             <a:r>
               <a:rPr lang="en-US" dirty="0"/>
-              <a:t>CSS is can be tricky</a:t>
+              <a:t>CSS </a:t>
+            </a:r>
+            <a:r>
+              <a:rPr lang="en-US" dirty="0" smtClean="0"/>
+              <a:t>can </a:t>
+            </a:r>
+            <a:r>
+              <a:rPr lang="en-US" dirty="0"/>
+              <a:t>be tricky</a:t>
             </a:r>
           </a:p>
           <a:p>
@@ -23895,6 +24228,21 @@
 </file>
 
 <file path=customXml/item1.xml><?xml version="1.0" encoding="utf-8"?>
+<p:properties xmlns:p="http://schemas.microsoft.com/office/2006/metadata/properties" xmlns:xsi="http://www.w3.org/2001/XMLSchema-instance" xmlns:pc="http://schemas.microsoft.com/office/infopath/2007/PartnerControls">
+  <documentManagement/>
+</p:properties>
+</file>
+
+<file path=customXml/item2.xml><?xml version="1.0" encoding="utf-8"?>
+<?mso-contentType ?>
+<FormTemplates xmlns="http://schemas.microsoft.com/sharepoint/v3/contenttype/forms">
+  <Display>DocumentLibraryForm</Display>
+  <Edit>DocumentLibraryForm</Edit>
+  <New>DocumentLibraryForm</New>
+</FormTemplates>
+</file>
+
+<file path=customXml/item3.xml><?xml version="1.0" encoding="utf-8"?>
 <ct:contentTypeSchema xmlns:ct="http://schemas.microsoft.com/office/2006/metadata/contentType" xmlns:ma="http://schemas.microsoft.com/office/2006/metadata/properties/metaAttributes" ct:_="" ma:_="" ma:contentTypeName="Document" ma:contentTypeID="0x010100391E57C78B9F604FB8BAD296D1460E2A" ma:contentTypeVersion="1" ma:contentTypeDescription="Create a new document." ma:contentTypeScope="" ma:versionID="fb382fe2362acd2155f454904f478e4d">
   <xsd:schema xmlns:xsd="http://www.w3.org/2001/XMLSchema" xmlns:xs="http://www.w3.org/2001/XMLSchema" xmlns:p="http://schemas.microsoft.com/office/2006/metadata/properties" xmlns:ns3="636b0322-90fb-440c-9cbc-22749e7231e9" targetNamespace="http://schemas.microsoft.com/office/2006/metadata/properties" ma:root="true" ma:fieldsID="b9887c63ce4710c1aeb75a5f03aecb69" ns3:_="">
     <xsd:import namespace="636b0322-90fb-440c-9cbc-22749e7231e9"/>
@@ -24034,22 +24382,31 @@
 </ct:contentTypeSchema>
 </file>
 
-<file path=customXml/item2.xml><?xml version="1.0" encoding="utf-8"?>
-<?mso-contentType ?>
-<FormTemplates xmlns="http://schemas.microsoft.com/sharepoint/v3/contenttype/forms">
-  <Display>DocumentLibraryForm</Display>
-  <Edit>DocumentLibraryForm</Edit>
-  <New>DocumentLibraryForm</New>
-</FormTemplates>
+<file path=customXml/itemProps1.xml><?xml version="1.0" encoding="utf-8"?>
+<ds:datastoreItem xmlns:ds="http://schemas.openxmlformats.org/officeDocument/2006/customXml" ds:itemID="{7025FDD9-4C58-4084-9F89-0E6ADD6FFF55}">
+  <ds:schemaRefs>
+    <ds:schemaRef ds:uri="http://purl.org/dc/terms/"/>
+    <ds:schemaRef ds:uri="http://schemas.microsoft.com/office/2006/documentManagement/types"/>
+    <ds:schemaRef ds:uri="http://purl.org/dc/dcmitype/"/>
+    <ds:schemaRef ds:uri="http://schemas.microsoft.com/office/infopath/2007/PartnerControls"/>
+    <ds:schemaRef ds:uri="http://purl.org/dc/elements/1.1/"/>
+    <ds:schemaRef ds:uri="http://schemas.microsoft.com/office/2006/metadata/properties"/>
+    <ds:schemaRef ds:uri="636b0322-90fb-440c-9cbc-22749e7231e9"/>
+    <ds:schemaRef ds:uri="http://schemas.openxmlformats.org/package/2006/metadata/core-properties"/>
+    <ds:schemaRef ds:uri="http://www.w3.org/XML/1998/namespace"/>
+  </ds:schemaRefs>
+</ds:datastoreItem>
 </file>
 
-<file path=customXml/item3.xml><?xml version="1.0" encoding="utf-8"?>
-<p:properties xmlns:p="http://schemas.microsoft.com/office/2006/metadata/properties" xmlns:xsi="http://www.w3.org/2001/XMLSchema-instance" xmlns:pc="http://schemas.microsoft.com/office/infopath/2007/PartnerControls">
-  <documentManagement/>
-</p:properties>
+<file path=customXml/itemProps2.xml><?xml version="1.0" encoding="utf-8"?>
+<ds:datastoreItem xmlns:ds="http://schemas.openxmlformats.org/officeDocument/2006/customXml" ds:itemID="{B0CA13EC-1D3C-4D6F-8D1C-E8A452CFC79A}">
+  <ds:schemaRefs>
+    <ds:schemaRef ds:uri="http://schemas.microsoft.com/sharepoint/v3/contenttype/forms"/>
+  </ds:schemaRefs>
+</ds:datastoreItem>
 </file>
 
-<file path=customXml/itemProps1.xml><?xml version="1.0" encoding="utf-8"?>
+<file path=customXml/itemProps3.xml><?xml version="1.0" encoding="utf-8"?>
 <ds:datastoreItem xmlns:ds="http://schemas.openxmlformats.org/officeDocument/2006/customXml" ds:itemID="{7B70CE0C-0988-423A-BF66-B40F6A1061FF}">
   <ds:schemaRefs>
     <ds:schemaRef ds:uri="http://schemas.microsoft.com/office/2006/metadata/contentType"/>
@@ -24065,28 +24422,4 @@
     <ds:schemaRef ds:uri="http://schemas.microsoft.com/internal/obd"/>
   </ds:schemaRefs>
 </ds:datastoreItem>
-</file>
-
-<file path=customXml/itemProps2.xml><?xml version="1.0" encoding="utf-8"?>
-<ds:datastoreItem xmlns:ds="http://schemas.openxmlformats.org/officeDocument/2006/customXml" ds:itemID="{B0CA13EC-1D3C-4D6F-8D1C-E8A452CFC79A}">
-  <ds:schemaRefs>
-    <ds:schemaRef ds:uri="http://schemas.microsoft.com/sharepoint/v3/contenttype/forms"/>
-  </ds:schemaRefs>
-</ds:datastoreItem>
-</file>
-
-<file path=customXml/itemProps3.xml><?xml version="1.0" encoding="utf-8"?>
-<ds:datastoreItem xmlns:ds="http://schemas.openxmlformats.org/officeDocument/2006/customXml" ds:itemID="{7025FDD9-4C58-4084-9F89-0E6ADD6FFF55}">
-  <ds:schemaRefs>
-    <ds:schemaRef ds:uri="http://purl.org/dc/terms/"/>
-    <ds:schemaRef ds:uri="http://schemas.microsoft.com/office/2006/documentManagement/types"/>
-    <ds:schemaRef ds:uri="http://purl.org/dc/dcmitype/"/>
-    <ds:schemaRef ds:uri="http://schemas.microsoft.com/office/infopath/2007/PartnerControls"/>
-    <ds:schemaRef ds:uri="http://purl.org/dc/elements/1.1/"/>
-    <ds:schemaRef ds:uri="http://schemas.microsoft.com/office/2006/metadata/properties"/>
-    <ds:schemaRef ds:uri="636b0322-90fb-440c-9cbc-22749e7231e9"/>
-    <ds:schemaRef ds:uri="http://schemas.openxmlformats.org/package/2006/metadata/core-properties"/>
-    <ds:schemaRef ds:uri="http://www.w3.org/XML/1998/namespace"/>
-  </ds:schemaRefs>
-</ds:datastoreItem>
 </file>
</xml_diff>